<commit_message>
Completed site map and updated powerpoint
</commit_message>
<xml_diff>
--- a/JokeRater.pptx
+++ b/JokeRater.pptx
@@ -6,10 +6,17 @@
   </p:sldMasterIdLst>
   <p:sldIdLst>
     <p:sldId id="256" r:id="rId2"/>
-    <p:sldId id="257" r:id="rId3"/>
-    <p:sldId id="258" r:id="rId4"/>
-    <p:sldId id="259" r:id="rId5"/>
-    <p:sldId id="260" r:id="rId6"/>
+    <p:sldId id="267" r:id="rId3"/>
+    <p:sldId id="257" r:id="rId4"/>
+    <p:sldId id="258" r:id="rId5"/>
+    <p:sldId id="259" r:id="rId6"/>
+    <p:sldId id="260" r:id="rId7"/>
+    <p:sldId id="261" r:id="rId8"/>
+    <p:sldId id="262" r:id="rId9"/>
+    <p:sldId id="263" r:id="rId10"/>
+    <p:sldId id="264" r:id="rId11"/>
+    <p:sldId id="265" r:id="rId12"/>
+    <p:sldId id="266" r:id="rId13"/>
   </p:sldIdLst>
   <p:sldSz cx="9144000" cy="6858000" type="screen4x3"/>
   <p:notesSz cx="6858000" cy="9144000"/>
@@ -293,7 +300,7 @@
             <a:fld id="{BFB62D08-2B6D-4BE7-BD75-624CBE385CC2}" type="datetimeFigureOut">
               <a:rPr lang="en-GB" smtClean="0"/>
               <a:pPr/>
-              <a:t>10/02/2015</a:t>
+              <a:t>21/02/2015</a:t>
             </a:fld>
             <a:endParaRPr lang="en-GB"/>
           </a:p>
@@ -460,7 +467,7 @@
             <a:fld id="{BFB62D08-2B6D-4BE7-BD75-624CBE385CC2}" type="datetimeFigureOut">
               <a:rPr lang="en-GB" smtClean="0"/>
               <a:pPr/>
-              <a:t>10/02/2015</a:t>
+              <a:t>21/02/2015</a:t>
             </a:fld>
             <a:endParaRPr lang="en-GB"/>
           </a:p>
@@ -637,7 +644,7 @@
             <a:fld id="{BFB62D08-2B6D-4BE7-BD75-624CBE385CC2}" type="datetimeFigureOut">
               <a:rPr lang="en-GB" smtClean="0"/>
               <a:pPr/>
-              <a:t>10/02/2015</a:t>
+              <a:t>21/02/2015</a:t>
             </a:fld>
             <a:endParaRPr lang="en-GB"/>
           </a:p>
@@ -804,7 +811,7 @@
             <a:fld id="{BFB62D08-2B6D-4BE7-BD75-624CBE385CC2}" type="datetimeFigureOut">
               <a:rPr lang="en-GB" smtClean="0"/>
               <a:pPr/>
-              <a:t>10/02/2015</a:t>
+              <a:t>21/02/2015</a:t>
             </a:fld>
             <a:endParaRPr lang="en-GB"/>
           </a:p>
@@ -1047,7 +1054,7 @@
             <a:fld id="{BFB62D08-2B6D-4BE7-BD75-624CBE385CC2}" type="datetimeFigureOut">
               <a:rPr lang="en-GB" smtClean="0"/>
               <a:pPr/>
-              <a:t>10/02/2015</a:t>
+              <a:t>21/02/2015</a:t>
             </a:fld>
             <a:endParaRPr lang="en-GB"/>
           </a:p>
@@ -1332,7 +1339,7 @@
             <a:fld id="{BFB62D08-2B6D-4BE7-BD75-624CBE385CC2}" type="datetimeFigureOut">
               <a:rPr lang="en-GB" smtClean="0"/>
               <a:pPr/>
-              <a:t>10/02/2015</a:t>
+              <a:t>21/02/2015</a:t>
             </a:fld>
             <a:endParaRPr lang="en-GB"/>
           </a:p>
@@ -1751,7 +1758,7 @@
             <a:fld id="{BFB62D08-2B6D-4BE7-BD75-624CBE385CC2}" type="datetimeFigureOut">
               <a:rPr lang="en-GB" smtClean="0"/>
               <a:pPr/>
-              <a:t>10/02/2015</a:t>
+              <a:t>21/02/2015</a:t>
             </a:fld>
             <a:endParaRPr lang="en-GB"/>
           </a:p>
@@ -1866,7 +1873,7 @@
             <a:fld id="{BFB62D08-2B6D-4BE7-BD75-624CBE385CC2}" type="datetimeFigureOut">
               <a:rPr lang="en-GB" smtClean="0"/>
               <a:pPr/>
-              <a:t>10/02/2015</a:t>
+              <a:t>21/02/2015</a:t>
             </a:fld>
             <a:endParaRPr lang="en-GB"/>
           </a:p>
@@ -1958,7 +1965,7 @@
             <a:fld id="{BFB62D08-2B6D-4BE7-BD75-624CBE385CC2}" type="datetimeFigureOut">
               <a:rPr lang="en-GB" smtClean="0"/>
               <a:pPr/>
-              <a:t>10/02/2015</a:t>
+              <a:t>21/02/2015</a:t>
             </a:fld>
             <a:endParaRPr lang="en-GB"/>
           </a:p>
@@ -2232,7 +2239,7 @@
             <a:fld id="{BFB62D08-2B6D-4BE7-BD75-624CBE385CC2}" type="datetimeFigureOut">
               <a:rPr lang="en-GB" smtClean="0"/>
               <a:pPr/>
-              <a:t>10/02/2015</a:t>
+              <a:t>21/02/2015</a:t>
             </a:fld>
             <a:endParaRPr lang="en-GB"/>
           </a:p>
@@ -2482,7 +2489,7 @@
             <a:fld id="{BFB62D08-2B6D-4BE7-BD75-624CBE385CC2}" type="datetimeFigureOut">
               <a:rPr lang="en-GB" smtClean="0"/>
               <a:pPr/>
-              <a:t>10/02/2015</a:t>
+              <a:t>21/02/2015</a:t>
             </a:fld>
             <a:endParaRPr lang="en-GB"/>
           </a:p>
@@ -2701,7 +2708,7 @@
             <a:fld id="{BFB62D08-2B6D-4BE7-BD75-624CBE385CC2}" type="datetimeFigureOut">
               <a:rPr lang="en-GB" smtClean="0"/>
               <a:pPr/>
-              <a:t>10/02/2015</a:t>
+              <a:t>21/02/2015</a:t>
             </a:fld>
             <a:endParaRPr lang="en-GB"/>
           </a:p>
@@ -3074,29 +3081,6 @@
       </p:grpSpPr>
       <p:sp>
         <p:nvSpPr>
-          <p:cNvPr id="2" name="Title 1"/>
-          <p:cNvSpPr>
-            <a:spLocks noGrp="1"/>
-          </p:cNvSpPr>
-          <p:nvPr>
-            <p:ph type="ctrTitle"/>
-          </p:nvPr>
-        </p:nvSpPr>
-        <p:spPr/>
-        <p:txBody>
-          <a:bodyPr/>
-          <a:lstStyle/>
-          <a:p>
-            <a:r>
-              <a:rPr lang="en-GB" dirty="0" err="1" smtClean="0"/>
-              <a:t>JokeRater</a:t>
-            </a:r>
-            <a:endParaRPr lang="en-GB" dirty="0"/>
-          </a:p>
-        </p:txBody>
-      </p:sp>
-      <p:sp>
-        <p:nvSpPr>
           <p:cNvPr id="3" name="Subtitle 2"/>
           <p:cNvSpPr>
             <a:spLocks noGrp="1"/>
@@ -3116,7 +3100,15 @@
                   <a:schemeClr val="tx1"/>
                 </a:solidFill>
               </a:rPr>
-              <a:t>Pear</a:t>
+              <a:t>Team </a:t>
+            </a:r>
+            <a:r>
+              <a:rPr lang="en-GB" dirty="0" smtClean="0">
+                <a:solidFill>
+                  <a:schemeClr val="tx1"/>
+                </a:solidFill>
+              </a:rPr>
+              <a:t>JR</a:t>
             </a:r>
             <a:endParaRPr lang="en-GB" dirty="0">
               <a:solidFill>
@@ -3126,11 +3118,493 @@
           </a:p>
         </p:txBody>
       </p:sp>
+      <p:sp>
+        <p:nvSpPr>
+          <p:cNvPr id="4" name="Title 3"/>
+          <p:cNvSpPr>
+            <a:spLocks noGrp="1"/>
+          </p:cNvSpPr>
+          <p:nvPr>
+            <p:ph type="ctrTitle"/>
+          </p:nvPr>
+        </p:nvSpPr>
+        <p:spPr/>
+        <p:txBody>
+          <a:bodyPr/>
+          <a:lstStyle/>
+          <a:p>
+            <a:endParaRPr lang="en-GB"/>
+          </a:p>
+        </p:txBody>
+      </p:sp>
+      <p:pic>
+        <p:nvPicPr>
+          <p:cNvPr id="5" name="Picture 4" descr="banner.png"/>
+          <p:cNvPicPr>
+            <a:picLocks noChangeAspect="1"/>
+          </p:cNvPicPr>
+          <p:nvPr/>
+        </p:nvPicPr>
+        <p:blipFill>
+          <a:blip r:embed="rId2" cstate="print"/>
+          <a:stretch>
+            <a:fillRect/>
+          </a:stretch>
+        </p:blipFill>
+        <p:spPr>
+          <a:xfrm>
+            <a:off x="251520" y="1124744"/>
+            <a:ext cx="8676456" cy="2512328"/>
+          </a:xfrm>
+          <a:prstGeom prst="rect">
+            <a:avLst/>
+          </a:prstGeom>
+        </p:spPr>
+      </p:pic>
     </p:spTree>
   </p:cSld>
   <p:clrMapOvr>
     <a:masterClrMapping/>
   </p:clrMapOvr>
+  <p:timing>
+    <p:tnLst>
+      <p:par>
+        <p:cTn id="1" dur="indefinite" restart="never" nodeType="tmRoot"/>
+      </p:par>
+    </p:tnLst>
+  </p:timing>
+</p:sld>
+</file>
+
+<file path=ppt/slides/slide10.xml><?xml version="1.0" encoding="utf-8"?>
+<p:sld xmlns:a="http://schemas.openxmlformats.org/drawingml/2006/main" xmlns:r="http://schemas.openxmlformats.org/officeDocument/2006/relationships" xmlns:p="http://schemas.openxmlformats.org/presentationml/2006/main">
+  <p:cSld>
+    <p:spTree>
+      <p:nvGrpSpPr>
+        <p:cNvPr id="1" name=""/>
+        <p:cNvGrpSpPr/>
+        <p:nvPr/>
+      </p:nvGrpSpPr>
+      <p:grpSpPr>
+        <a:xfrm>
+          <a:off x="0" y="0"/>
+          <a:ext cx="0" cy="0"/>
+          <a:chOff x="0" y="0"/>
+          <a:chExt cx="0" cy="0"/>
+        </a:xfrm>
+      </p:grpSpPr>
+      <p:pic>
+        <p:nvPicPr>
+          <p:cNvPr id="2" name="Picture 1" descr="wireframe profile.png"/>
+          <p:cNvPicPr>
+            <a:picLocks noChangeAspect="1"/>
+          </p:cNvPicPr>
+          <p:nvPr/>
+        </p:nvPicPr>
+        <p:blipFill>
+          <a:blip r:embed="rId2" cstate="print"/>
+          <a:stretch>
+            <a:fillRect/>
+          </a:stretch>
+        </p:blipFill>
+        <p:spPr>
+          <a:xfrm>
+            <a:off x="0" y="0"/>
+            <a:ext cx="9144000" cy="6858000"/>
+          </a:xfrm>
+          <a:prstGeom prst="rect">
+            <a:avLst/>
+          </a:prstGeom>
+        </p:spPr>
+      </p:pic>
+    </p:spTree>
+  </p:cSld>
+  <p:clrMapOvr>
+    <a:masterClrMapping/>
+  </p:clrMapOvr>
+  <p:timing>
+    <p:tnLst>
+      <p:par>
+        <p:cTn id="1" dur="indefinite" restart="never" nodeType="tmRoot"/>
+      </p:par>
+    </p:tnLst>
+  </p:timing>
+</p:sld>
+</file>
+
+<file path=ppt/slides/slide11.xml><?xml version="1.0" encoding="utf-8"?>
+<p:sld xmlns:a="http://schemas.openxmlformats.org/drawingml/2006/main" xmlns:r="http://schemas.openxmlformats.org/officeDocument/2006/relationships" xmlns:p="http://schemas.openxmlformats.org/presentationml/2006/main">
+  <p:cSld>
+    <p:spTree>
+      <p:nvGrpSpPr>
+        <p:cNvPr id="1" name=""/>
+        <p:cNvGrpSpPr/>
+        <p:nvPr/>
+      </p:nvGrpSpPr>
+      <p:grpSpPr>
+        <a:xfrm>
+          <a:off x="0" y="0"/>
+          <a:ext cx="0" cy="0"/>
+          <a:chOff x="0" y="0"/>
+          <a:chExt cx="0" cy="0"/>
+        </a:xfrm>
+      </p:grpSpPr>
+      <p:sp>
+        <p:nvSpPr>
+          <p:cNvPr id="2" name="Title 1"/>
+          <p:cNvSpPr>
+            <a:spLocks noGrp="1"/>
+          </p:cNvSpPr>
+          <p:nvPr>
+            <p:ph type="title"/>
+          </p:nvPr>
+        </p:nvSpPr>
+        <p:spPr/>
+        <p:txBody>
+          <a:bodyPr/>
+          <a:lstStyle/>
+          <a:p>
+            <a:r>
+              <a:rPr lang="en-GB" dirty="0" smtClean="0"/>
+              <a:t>Site Map (1)</a:t>
+            </a:r>
+            <a:endParaRPr lang="en-GB" dirty="0"/>
+          </a:p>
+        </p:txBody>
+      </p:sp>
+      <p:sp>
+        <p:nvSpPr>
+          <p:cNvPr id="3" name="Content Placeholder 2"/>
+          <p:cNvSpPr>
+            <a:spLocks noGrp="1"/>
+          </p:cNvSpPr>
+          <p:nvPr>
+            <p:ph idx="1"/>
+          </p:nvPr>
+        </p:nvSpPr>
+        <p:spPr/>
+        <p:txBody>
+          <a:bodyPr>
+            <a:normAutofit/>
+          </a:bodyPr>
+          <a:lstStyle/>
+          <a:p>
+            <a:pPr>
+              <a:buNone/>
+            </a:pPr>
+            <a:r>
+              <a:rPr lang="en-GB" sz="2400" dirty="0" smtClean="0"/>
+              <a:t>/</a:t>
+            </a:r>
+            <a:r>
+              <a:rPr lang="en-GB" sz="2400" dirty="0" err="1" smtClean="0"/>
+              <a:t>JokeRater</a:t>
+            </a:r>
+            <a:r>
+              <a:rPr lang="en-GB" sz="2400" dirty="0" smtClean="0"/>
+              <a:t>/main</a:t>
+            </a:r>
+          </a:p>
+          <a:p>
+            <a:pPr>
+              <a:buNone/>
+            </a:pPr>
+            <a:r>
+              <a:rPr lang="en-GB" sz="1600" dirty="0" smtClean="0"/>
+              <a:t>The first page the user sees showing two jokes from a random category to be compared together</a:t>
+            </a:r>
+          </a:p>
+          <a:p>
+            <a:pPr>
+              <a:buNone/>
+            </a:pPr>
+            <a:endParaRPr lang="en-GB" sz="1600" dirty="0" smtClean="0"/>
+          </a:p>
+          <a:p>
+            <a:pPr>
+              <a:buNone/>
+            </a:pPr>
+            <a:r>
+              <a:rPr lang="en-GB" sz="2400" dirty="0" smtClean="0"/>
+              <a:t>/</a:t>
+            </a:r>
+            <a:r>
+              <a:rPr lang="en-GB" sz="2400" dirty="0" err="1" smtClean="0"/>
+              <a:t>JokeRater</a:t>
+            </a:r>
+            <a:r>
+              <a:rPr lang="en-GB" sz="2400" dirty="0" smtClean="0"/>
+              <a:t>/joke</a:t>
+            </a:r>
+          </a:p>
+          <a:p>
+            <a:pPr>
+              <a:buNone/>
+            </a:pPr>
+            <a:r>
+              <a:rPr lang="en-GB" sz="1600" dirty="0" smtClean="0"/>
+              <a:t>Accessed when viewing a joke directly or have selected random joke</a:t>
+            </a:r>
+          </a:p>
+          <a:p>
+            <a:pPr>
+              <a:buNone/>
+            </a:pPr>
+            <a:endParaRPr lang="en-GB" sz="1600" dirty="0" smtClean="0"/>
+          </a:p>
+          <a:p>
+            <a:pPr>
+              <a:buNone/>
+            </a:pPr>
+            <a:r>
+              <a:rPr lang="en-GB" sz="2400" dirty="0" smtClean="0"/>
+              <a:t>/</a:t>
+            </a:r>
+            <a:r>
+              <a:rPr lang="en-GB" sz="2400" dirty="0" err="1" smtClean="0"/>
+              <a:t>JokeRater</a:t>
+            </a:r>
+            <a:r>
+              <a:rPr lang="en-GB" sz="2400" dirty="0" smtClean="0"/>
+              <a:t>/category/...........</a:t>
+            </a:r>
+          </a:p>
+          <a:p>
+            <a:pPr>
+              <a:buNone/>
+            </a:pPr>
+            <a:r>
+              <a:rPr lang="en-GB" sz="1600" dirty="0" smtClean="0"/>
+              <a:t>Similar to the main page but guarantees the jokes will be from a given category  </a:t>
+            </a:r>
+          </a:p>
+          <a:p>
+            <a:pPr>
+              <a:buNone/>
+            </a:pPr>
+            <a:endParaRPr lang="en-GB" sz="1600" dirty="0" smtClean="0"/>
+          </a:p>
+          <a:p>
+            <a:pPr>
+              <a:buNone/>
+            </a:pPr>
+            <a:r>
+              <a:rPr lang="en-GB" sz="2400" dirty="0" smtClean="0"/>
+              <a:t>/</a:t>
+            </a:r>
+            <a:r>
+              <a:rPr lang="en-GB" sz="2400" dirty="0" err="1" smtClean="0"/>
+              <a:t>JokeRater</a:t>
+            </a:r>
+            <a:r>
+              <a:rPr lang="en-GB" sz="2400" dirty="0" smtClean="0"/>
+              <a:t>/</a:t>
+            </a:r>
+            <a:r>
+              <a:rPr lang="en-GB" sz="2400" dirty="0" err="1" smtClean="0"/>
+              <a:t>topRated</a:t>
+            </a:r>
+            <a:endParaRPr lang="en-GB" sz="2400" dirty="0" smtClean="0"/>
+          </a:p>
+          <a:p>
+            <a:pPr>
+              <a:buNone/>
+            </a:pPr>
+            <a:r>
+              <a:rPr lang="en-GB" sz="1600" dirty="0" smtClean="0"/>
+              <a:t>Allows the user to view the top 20 jokes in a given category, for a given time period</a:t>
+            </a:r>
+          </a:p>
+          <a:p>
+            <a:pPr>
+              <a:buNone/>
+            </a:pPr>
+            <a:endParaRPr lang="en-GB" sz="2400" dirty="0" smtClean="0"/>
+          </a:p>
+        </p:txBody>
+      </p:sp>
+    </p:spTree>
+  </p:cSld>
+  <p:clrMapOvr>
+    <a:masterClrMapping/>
+  </p:clrMapOvr>
+  <p:timing>
+    <p:tnLst>
+      <p:par>
+        <p:cTn id="1" dur="indefinite" restart="never" nodeType="tmRoot"/>
+      </p:par>
+    </p:tnLst>
+  </p:timing>
+</p:sld>
+</file>
+
+<file path=ppt/slides/slide12.xml><?xml version="1.0" encoding="utf-8"?>
+<p:sld xmlns:a="http://schemas.openxmlformats.org/drawingml/2006/main" xmlns:r="http://schemas.openxmlformats.org/officeDocument/2006/relationships" xmlns:p="http://schemas.openxmlformats.org/presentationml/2006/main">
+  <p:cSld>
+    <p:spTree>
+      <p:nvGrpSpPr>
+        <p:cNvPr id="1" name=""/>
+        <p:cNvGrpSpPr/>
+        <p:nvPr/>
+      </p:nvGrpSpPr>
+      <p:grpSpPr>
+        <a:xfrm>
+          <a:off x="0" y="0"/>
+          <a:ext cx="0" cy="0"/>
+          <a:chOff x="0" y="0"/>
+          <a:chExt cx="0" cy="0"/>
+        </a:xfrm>
+      </p:grpSpPr>
+      <p:sp>
+        <p:nvSpPr>
+          <p:cNvPr id="2" name="Title 1"/>
+          <p:cNvSpPr>
+            <a:spLocks noGrp="1"/>
+          </p:cNvSpPr>
+          <p:nvPr>
+            <p:ph type="title"/>
+          </p:nvPr>
+        </p:nvSpPr>
+        <p:spPr/>
+        <p:txBody>
+          <a:bodyPr/>
+          <a:lstStyle/>
+          <a:p>
+            <a:r>
+              <a:rPr lang="en-GB" dirty="0" smtClean="0"/>
+              <a:t>Site Map (2)</a:t>
+            </a:r>
+            <a:endParaRPr lang="en-GB" dirty="0"/>
+          </a:p>
+        </p:txBody>
+      </p:sp>
+      <p:sp>
+        <p:nvSpPr>
+          <p:cNvPr id="3" name="Content Placeholder 2"/>
+          <p:cNvSpPr>
+            <a:spLocks noGrp="1"/>
+          </p:cNvSpPr>
+          <p:nvPr>
+            <p:ph idx="1"/>
+          </p:nvPr>
+        </p:nvSpPr>
+        <p:spPr/>
+        <p:txBody>
+          <a:bodyPr/>
+          <a:lstStyle/>
+          <a:p>
+            <a:pPr>
+              <a:buNone/>
+            </a:pPr>
+            <a:r>
+              <a:rPr lang="en-GB" sz="2400" dirty="0" smtClean="0"/>
+              <a:t>/</a:t>
+            </a:r>
+            <a:r>
+              <a:rPr lang="en-GB" sz="2400" dirty="0" err="1" smtClean="0"/>
+              <a:t>JokeRater</a:t>
+            </a:r>
+            <a:r>
+              <a:rPr lang="en-GB" sz="2400" dirty="0" smtClean="0"/>
+              <a:t>/login</a:t>
+            </a:r>
+          </a:p>
+          <a:p>
+            <a:pPr>
+              <a:buNone/>
+            </a:pPr>
+            <a:r>
+              <a:rPr lang="en-GB" sz="1600" dirty="0" smtClean="0"/>
+              <a:t>Login page</a:t>
+            </a:r>
+          </a:p>
+          <a:p>
+            <a:pPr>
+              <a:buNone/>
+            </a:pPr>
+            <a:endParaRPr lang="en-GB" sz="1600" dirty="0" smtClean="0"/>
+          </a:p>
+          <a:p>
+            <a:pPr>
+              <a:buNone/>
+            </a:pPr>
+            <a:r>
+              <a:rPr lang="en-GB" sz="2400" dirty="0" smtClean="0"/>
+              <a:t>/</a:t>
+            </a:r>
+            <a:r>
+              <a:rPr lang="en-GB" sz="2400" dirty="0" err="1" smtClean="0"/>
+              <a:t>JokeRater</a:t>
+            </a:r>
+            <a:r>
+              <a:rPr lang="en-GB" sz="2400" dirty="0" smtClean="0"/>
+              <a:t>/register</a:t>
+            </a:r>
+          </a:p>
+          <a:p>
+            <a:pPr>
+              <a:buNone/>
+            </a:pPr>
+            <a:r>
+              <a:rPr lang="en-GB" sz="1600" dirty="0" smtClean="0"/>
+              <a:t>Allows first time users to register with the site such that they are able to upload jokes</a:t>
+            </a:r>
+          </a:p>
+          <a:p>
+            <a:pPr>
+              <a:buNone/>
+            </a:pPr>
+            <a:endParaRPr lang="en-GB" sz="2400" dirty="0" smtClean="0"/>
+          </a:p>
+          <a:p>
+            <a:pPr>
+              <a:buNone/>
+            </a:pPr>
+            <a:r>
+              <a:rPr lang="en-GB" sz="2400" dirty="0" smtClean="0"/>
+              <a:t>/</a:t>
+            </a:r>
+            <a:r>
+              <a:rPr lang="en-GB" sz="2400" dirty="0" err="1" smtClean="0"/>
+              <a:t>JokeRater</a:t>
+            </a:r>
+            <a:r>
+              <a:rPr lang="en-GB" sz="2400" dirty="0" smtClean="0"/>
+              <a:t>/</a:t>
+            </a:r>
+            <a:r>
+              <a:rPr lang="en-GB" sz="2400" dirty="0" err="1" smtClean="0"/>
+              <a:t>myProfile</a:t>
+            </a:r>
+            <a:endParaRPr lang="en-GB" sz="2400" dirty="0" smtClean="0"/>
+          </a:p>
+          <a:p>
+            <a:pPr>
+              <a:buNone/>
+            </a:pPr>
+            <a:r>
+              <a:rPr lang="en-GB" sz="1600" dirty="0" smtClean="0"/>
+              <a:t>Users can upload jokes as well as viewing the statistics of the jokes they have previously uploaded</a:t>
+            </a:r>
+            <a:endParaRPr lang="en-GB" sz="1600" dirty="0" smtClean="0"/>
+          </a:p>
+          <a:p>
+            <a:endParaRPr lang="en-GB" dirty="0"/>
+          </a:p>
+        </p:txBody>
+      </p:sp>
+    </p:spTree>
+  </p:cSld>
+  <p:clrMapOvr>
+    <a:masterClrMapping/>
+  </p:clrMapOvr>
+  <p:timing>
+    <p:tnLst>
+      <p:par>
+        <p:cTn id="1" dur="indefinite" restart="never" nodeType="tmRoot"/>
+      </p:par>
+    </p:tnLst>
+  </p:timing>
 </p:sld>
 </file>
 
@@ -3167,10 +3641,10 @@
           <a:lstStyle/>
           <a:p>
             <a:r>
-              <a:rPr lang="en-GB" b="1" dirty="0" smtClean="0"/>
-              <a:t>Specification List </a:t>
-            </a:r>
-            <a:endParaRPr lang="en-GB" b="1" dirty="0"/>
+              <a:rPr lang="en-GB" dirty="0" smtClean="0"/>
+              <a:t>Function</a:t>
+            </a:r>
+            <a:endParaRPr lang="en-GB" dirty="0"/>
           </a:p>
         </p:txBody>
       </p:sp>
@@ -3186,67 +3660,22 @@
         </p:nvSpPr>
         <p:spPr>
           <a:xfrm>
-            <a:off x="457200" y="1412776"/>
-            <a:ext cx="8229600" cy="5184576"/>
+            <a:off x="457200" y="2514600"/>
+            <a:ext cx="8229600" cy="1828800"/>
           </a:xfrm>
         </p:spPr>
         <p:txBody>
-          <a:bodyPr>
-            <a:normAutofit lnSpcReduction="10000"/>
-          </a:bodyPr>
-          <a:lstStyle/>
-          <a:p>
-            <a:r>
-              <a:rPr lang="en-GB" b="1" dirty="0" smtClean="0"/>
-              <a:t>Must:</a:t>
-            </a:r>
+          <a:bodyPr/>
+          <a:lstStyle/>
+          <a:p>
+            <a:pPr>
+              <a:buNone/>
+            </a:pPr>
             <a:r>
               <a:rPr lang="en-GB" dirty="0" smtClean="0"/>
-              <a:t> Create a collection of the most popular jokes as rated by users</a:t>
-            </a:r>
-          </a:p>
-          <a:p>
-            <a:r>
-              <a:rPr lang="en-GB" b="1" dirty="0" smtClean="0"/>
-              <a:t>Must:</a:t>
-            </a:r>
-            <a:r>
-              <a:rPr lang="en-GB" dirty="0" smtClean="0"/>
-              <a:t> Users should be able to upload jokes and rate other people’s</a:t>
-            </a:r>
-          </a:p>
-          <a:p>
-            <a:r>
-              <a:rPr lang="en-GB" b="1" dirty="0" smtClean="0"/>
-              <a:t>Must:</a:t>
-            </a:r>
-            <a:r>
-              <a:rPr lang="en-GB" dirty="0" smtClean="0"/>
-              <a:t> Jokes will be rated by directly comparing two jokes against each other</a:t>
-            </a:r>
-          </a:p>
-          <a:p>
-            <a:r>
-              <a:rPr lang="en-GB" b="1" dirty="0" smtClean="0"/>
-              <a:t>Should:</a:t>
-            </a:r>
-            <a:r>
-              <a:rPr lang="en-GB" dirty="0" smtClean="0"/>
-              <a:t> Jokes will be sorted and rated by category</a:t>
-            </a:r>
-          </a:p>
-          <a:p>
-            <a:r>
-              <a:rPr lang="en-GB" b="1" dirty="0" smtClean="0"/>
-              <a:t>Should:</a:t>
-            </a:r>
-            <a:r>
-              <a:rPr lang="en-GB" dirty="0" smtClean="0"/>
-              <a:t> Users can find the highest rated jokes in each category</a:t>
-            </a:r>
-          </a:p>
-          <a:p>
-            <a:endParaRPr lang="en-GB" dirty="0" smtClean="0"/>
+              <a:t>To discover the funniest jokes as rated and uploaded by users by directly comparing jokes     	to one another</a:t>
+            </a:r>
+            <a:endParaRPr lang="en-GB" dirty="0"/>
           </a:p>
         </p:txBody>
       </p:sp>
@@ -3292,7 +3721,7 @@
           <a:p>
             <a:r>
               <a:rPr lang="en-GB" b="1" dirty="0" smtClean="0"/>
-              <a:t>Specification list continued</a:t>
+              <a:t>Specification List </a:t>
             </a:r>
             <a:endParaRPr lang="en-GB" b="1" dirty="0"/>
           </a:p>
@@ -3310,8 +3739,8 @@
         </p:nvSpPr>
         <p:spPr>
           <a:xfrm>
-            <a:off x="457200" y="1340768"/>
-            <a:ext cx="8229600" cy="5112568"/>
+            <a:off x="457200" y="1412776"/>
+            <a:ext cx="8229600" cy="5184576"/>
           </a:xfrm>
         </p:spPr>
         <p:txBody>
@@ -3322,64 +3751,55 @@
           <a:p>
             <a:r>
               <a:rPr lang="en-GB" b="1" dirty="0" smtClean="0"/>
-              <a:t>Should: </a:t>
+              <a:t>Must:</a:t>
             </a:r>
             <a:r>
               <a:rPr lang="en-GB" dirty="0" smtClean="0"/>
-              <a:t>Users will not need to log in to rate jokes</a:t>
-            </a:r>
-            <a:endParaRPr lang="en-GB" b="1" dirty="0" smtClean="0"/>
+              <a:t> Create a collection of the most popular jokes as rated by users</a:t>
+            </a:r>
           </a:p>
           <a:p>
             <a:r>
               <a:rPr lang="en-GB" b="1" dirty="0" smtClean="0"/>
-              <a:t>Could:</a:t>
+              <a:t>Must:</a:t>
             </a:r>
             <a:r>
               <a:rPr lang="en-GB" dirty="0" smtClean="0"/>
-              <a:t> Allow users to have a profile page which will display their personal jokes</a:t>
+              <a:t> Users should be able to upload jokes and rate other people’s</a:t>
             </a:r>
           </a:p>
           <a:p>
             <a:r>
               <a:rPr lang="en-GB" b="1" dirty="0" smtClean="0"/>
-              <a:t>Could:</a:t>
+              <a:t>Must:</a:t>
             </a:r>
             <a:r>
               <a:rPr lang="en-GB" dirty="0" smtClean="0"/>
-              <a:t> Handle static media jokes</a:t>
+              <a:t> Jokes will be rated by directly comparing two jokes against each other</a:t>
             </a:r>
           </a:p>
           <a:p>
             <a:r>
               <a:rPr lang="en-GB" b="1" dirty="0" smtClean="0"/>
-              <a:t>Could:</a:t>
+              <a:t>Should:</a:t>
             </a:r>
             <a:r>
               <a:rPr lang="en-GB" dirty="0" smtClean="0"/>
-              <a:t> Allow users to report offensive jokes</a:t>
+              <a:t> Jokes will be sorted and rated by category</a:t>
             </a:r>
           </a:p>
           <a:p>
             <a:r>
               <a:rPr lang="en-GB" b="1" dirty="0" smtClean="0"/>
-              <a:t>Wont:</a:t>
+              <a:t>Should:</a:t>
             </a:r>
             <a:r>
               <a:rPr lang="en-GB" dirty="0" smtClean="0"/>
-              <a:t> Allow users to rate a particular joke directly</a:t>
-            </a:r>
-          </a:p>
-          <a:p>
-            <a:r>
-              <a:rPr lang="en-GB" b="1" dirty="0" smtClean="0"/>
-              <a:t>Wont: </a:t>
-            </a:r>
-            <a:r>
-              <a:rPr lang="en-GB" dirty="0" smtClean="0"/>
-              <a:t>Allow users to comment on a joke directly</a:t>
-            </a:r>
-            <a:endParaRPr lang="en-GB" dirty="0"/>
+              <a:t> Users can find the highest rated jokes in each category</a:t>
+            </a:r>
+          </a:p>
+          <a:p>
+            <a:endParaRPr lang="en-GB" dirty="0" smtClean="0"/>
           </a:p>
         </p:txBody>
       </p:sp>
@@ -3388,6 +3808,13 @@
   <p:clrMapOvr>
     <a:masterClrMapping/>
   </p:clrMapOvr>
+  <p:timing>
+    <p:tnLst>
+      <p:par>
+        <p:cTn id="1" dur="indefinite" restart="never" nodeType="tmRoot"/>
+      </p:par>
+    </p:tnLst>
+  </p:timing>
 </p:sld>
 </file>
 
@@ -3424,6 +3851,146 @@
           <a:lstStyle/>
           <a:p>
             <a:r>
+              <a:rPr lang="en-GB" b="1" dirty="0" smtClean="0"/>
+              <a:t>Specification list continued</a:t>
+            </a:r>
+            <a:endParaRPr lang="en-GB" b="1" dirty="0"/>
+          </a:p>
+        </p:txBody>
+      </p:sp>
+      <p:sp>
+        <p:nvSpPr>
+          <p:cNvPr id="3" name="Content Placeholder 2"/>
+          <p:cNvSpPr>
+            <a:spLocks noGrp="1"/>
+          </p:cNvSpPr>
+          <p:nvPr>
+            <p:ph idx="1"/>
+          </p:nvPr>
+        </p:nvSpPr>
+        <p:spPr>
+          <a:xfrm>
+            <a:off x="457200" y="1340768"/>
+            <a:ext cx="8229600" cy="5112568"/>
+          </a:xfrm>
+        </p:spPr>
+        <p:txBody>
+          <a:bodyPr>
+            <a:normAutofit lnSpcReduction="10000"/>
+          </a:bodyPr>
+          <a:lstStyle/>
+          <a:p>
+            <a:r>
+              <a:rPr lang="en-GB" b="1" dirty="0" smtClean="0"/>
+              <a:t>Should: </a:t>
+            </a:r>
+            <a:r>
+              <a:rPr lang="en-GB" dirty="0" smtClean="0"/>
+              <a:t>Users will not need to log in to rate jokes</a:t>
+            </a:r>
+            <a:endParaRPr lang="en-GB" b="1" dirty="0" smtClean="0"/>
+          </a:p>
+          <a:p>
+            <a:r>
+              <a:rPr lang="en-GB" b="1" dirty="0" smtClean="0"/>
+              <a:t>Could:</a:t>
+            </a:r>
+            <a:r>
+              <a:rPr lang="en-GB" dirty="0" smtClean="0"/>
+              <a:t> Allow users to have a profile page which will display their personal jokes</a:t>
+            </a:r>
+          </a:p>
+          <a:p>
+            <a:r>
+              <a:rPr lang="en-GB" b="1" dirty="0" smtClean="0"/>
+              <a:t>Could:</a:t>
+            </a:r>
+            <a:r>
+              <a:rPr lang="en-GB" dirty="0" smtClean="0"/>
+              <a:t> Handle static media jokes</a:t>
+            </a:r>
+          </a:p>
+          <a:p>
+            <a:r>
+              <a:rPr lang="en-GB" b="1" dirty="0" smtClean="0"/>
+              <a:t>Could:</a:t>
+            </a:r>
+            <a:r>
+              <a:rPr lang="en-GB" dirty="0" smtClean="0"/>
+              <a:t> Allow users to report offensive jokes</a:t>
+            </a:r>
+          </a:p>
+          <a:p>
+            <a:r>
+              <a:rPr lang="en-GB" b="1" dirty="0" smtClean="0"/>
+              <a:t>Wont:</a:t>
+            </a:r>
+            <a:r>
+              <a:rPr lang="en-GB" dirty="0" smtClean="0"/>
+              <a:t> Allow users to rate a particular joke directly</a:t>
+            </a:r>
+          </a:p>
+          <a:p>
+            <a:r>
+              <a:rPr lang="en-GB" b="1" dirty="0" smtClean="0"/>
+              <a:t>Wont: </a:t>
+            </a:r>
+            <a:r>
+              <a:rPr lang="en-GB" dirty="0" smtClean="0"/>
+              <a:t>Allow users to comment on a joke directly</a:t>
+            </a:r>
+            <a:endParaRPr lang="en-GB" dirty="0"/>
+          </a:p>
+        </p:txBody>
+      </p:sp>
+    </p:spTree>
+  </p:cSld>
+  <p:clrMapOvr>
+    <a:masterClrMapping/>
+  </p:clrMapOvr>
+  <p:timing>
+    <p:tnLst>
+      <p:par>
+        <p:cTn id="1" dur="indefinite" restart="never" nodeType="tmRoot"/>
+      </p:par>
+    </p:tnLst>
+  </p:timing>
+</p:sld>
+</file>
+
+<file path=ppt/slides/slide5.xml><?xml version="1.0" encoding="utf-8"?>
+<p:sld xmlns:a="http://schemas.openxmlformats.org/drawingml/2006/main" xmlns:r="http://schemas.openxmlformats.org/officeDocument/2006/relationships" xmlns:p="http://schemas.openxmlformats.org/presentationml/2006/main">
+  <p:cSld>
+    <p:spTree>
+      <p:nvGrpSpPr>
+        <p:cNvPr id="1" name=""/>
+        <p:cNvGrpSpPr/>
+        <p:nvPr/>
+      </p:nvGrpSpPr>
+      <p:grpSpPr>
+        <a:xfrm>
+          <a:off x="0" y="0"/>
+          <a:ext cx="0" cy="0"/>
+          <a:chOff x="0" y="0"/>
+          <a:chExt cx="0" cy="0"/>
+        </a:xfrm>
+      </p:grpSpPr>
+      <p:sp>
+        <p:nvSpPr>
+          <p:cNvPr id="2" name="Title 1"/>
+          <p:cNvSpPr>
+            <a:spLocks noGrp="1"/>
+          </p:cNvSpPr>
+          <p:nvPr>
+            <p:ph type="title"/>
+          </p:nvPr>
+        </p:nvSpPr>
+        <p:spPr/>
+        <p:txBody>
+          <a:bodyPr/>
+          <a:lstStyle/>
+          <a:p>
+            <a:r>
               <a:rPr lang="en-GB" dirty="0" smtClean="0"/>
               <a:t>User Persona 1 - Viewer</a:t>
             </a:r>
@@ -3464,11 +4031,7 @@
           <a:p>
             <a:r>
               <a:rPr lang="en-GB" sz="1300" dirty="0" smtClean="0"/>
-              <a:t>Tim has </a:t>
-            </a:r>
-            <a:r>
-              <a:rPr lang="en-GB" sz="1300" dirty="0" smtClean="0"/>
-              <a:t>half an hour to fill while waiting for a train and is looking for a quick laugh.</a:t>
+              <a:t>Tim has half an hour to fill while waiting for a train and is looking for a quick laugh.</a:t>
             </a:r>
           </a:p>
           <a:p>
@@ -3807,11 +4370,7 @@
             </a:r>
             <a:r>
               <a:rPr lang="en-GB" sz="1300" dirty="0" smtClean="0"/>
-              <a:t> </a:t>
-            </a:r>
-            <a:r>
-              <a:rPr lang="en-GB" sz="1300" dirty="0" smtClean="0"/>
-              <a:t>smart, light-hearted, quick-thinking</a:t>
+              <a:t> smart, light-hearted, quick-thinking</a:t>
             </a:r>
             <a:endParaRPr kumimoji="0" lang="en-GB" sz="1300" i="0" u="none" strike="noStrike" kern="1200" cap="none" spc="0" normalizeH="0" baseline="0" noProof="0" dirty="0" smtClean="0">
               <a:ln>
@@ -3835,10 +4394,17 @@
   <p:clrMapOvr>
     <a:masterClrMapping/>
   </p:clrMapOvr>
+  <p:timing>
+    <p:tnLst>
+      <p:par>
+        <p:cTn id="1" dur="indefinite" restart="never" nodeType="tmRoot"/>
+      </p:par>
+    </p:tnLst>
+  </p:timing>
 </p:sld>
 </file>
 
-<file path=ppt/slides/slide5.xml><?xml version="1.0" encoding="utf-8"?>
+<file path=ppt/slides/slide6.xml><?xml version="1.0" encoding="utf-8"?>
 <p:sld xmlns:a="http://schemas.openxmlformats.org/drawingml/2006/main" xmlns:r="http://schemas.openxmlformats.org/officeDocument/2006/relationships" xmlns:p="http://schemas.openxmlformats.org/presentationml/2006/main">
   <p:cSld>
     <p:spTree>
@@ -3913,23 +4479,14 @@
           <a:p>
             <a:r>
               <a:rPr lang="en-GB" sz="1400" dirty="0" smtClean="0"/>
-              <a:t>Claire </a:t>
-            </a:r>
+              <a:t>Claire has a talent for clever puns and is looking to share her creativity with other people</a:t>
+            </a:r>
+          </a:p>
+          <a:p>
             <a:r>
               <a:rPr lang="en-GB" sz="1400" dirty="0" smtClean="0"/>
-              <a:t>has a talent for clever puns and is looking to share her creativity with other people</a:t>
-            </a:r>
-          </a:p>
-          <a:p>
-            <a:r>
-              <a:rPr lang="en-GB" sz="1400" dirty="0" smtClean="0"/>
-              <a:t>Claire wants to be able to create a user profile through which she can upload her </a:t>
-            </a:r>
-            <a:r>
-              <a:rPr lang="en-GB" sz="1400" dirty="0" smtClean="0"/>
-              <a:t>jokes</a:t>
-            </a:r>
-            <a:endParaRPr lang="en-GB" sz="1400" dirty="0" smtClean="0"/>
+              <a:t>Claire wants to be able to create a user profile through which she can upload her jokes</a:t>
+            </a:r>
           </a:p>
           <a:p>
             <a:r>
@@ -4369,6 +4926,203 @@
   <p:clrMapOvr>
     <a:masterClrMapping/>
   </p:clrMapOvr>
+  <p:timing>
+    <p:tnLst>
+      <p:par>
+        <p:cTn id="1" dur="indefinite" restart="never" nodeType="tmRoot"/>
+      </p:par>
+    </p:tnLst>
+  </p:timing>
+</p:sld>
+</file>
+
+<file path=ppt/slides/slide7.xml><?xml version="1.0" encoding="utf-8"?>
+<p:sld xmlns:a="http://schemas.openxmlformats.org/drawingml/2006/main" xmlns:r="http://schemas.openxmlformats.org/officeDocument/2006/relationships" xmlns:p="http://schemas.openxmlformats.org/presentationml/2006/main">
+  <p:cSld>
+    <p:spTree>
+      <p:nvGrpSpPr>
+        <p:cNvPr id="1" name=""/>
+        <p:cNvGrpSpPr/>
+        <p:nvPr/>
+      </p:nvGrpSpPr>
+      <p:grpSpPr>
+        <a:xfrm>
+          <a:off x="0" y="0"/>
+          <a:ext cx="0" cy="0"/>
+          <a:chOff x="0" y="0"/>
+          <a:chExt cx="0" cy="0"/>
+        </a:xfrm>
+      </p:grpSpPr>
+      <p:pic>
+        <p:nvPicPr>
+          <p:cNvPr id="4" name="Picture 3" descr="ER Diagram.jpg"/>
+          <p:cNvPicPr>
+            <a:picLocks noChangeAspect="1"/>
+          </p:cNvPicPr>
+          <p:nvPr/>
+        </p:nvPicPr>
+        <p:blipFill>
+          <a:blip r:embed="rId2" cstate="print"/>
+          <a:stretch>
+            <a:fillRect/>
+          </a:stretch>
+        </p:blipFill>
+        <p:spPr>
+          <a:xfrm>
+            <a:off x="467544" y="476672"/>
+            <a:ext cx="8064896" cy="6036180"/>
+          </a:xfrm>
+          <a:prstGeom prst="rect">
+            <a:avLst/>
+          </a:prstGeom>
+        </p:spPr>
+      </p:pic>
+    </p:spTree>
+  </p:cSld>
+  <p:clrMapOvr>
+    <a:masterClrMapping/>
+  </p:clrMapOvr>
+  <p:timing>
+    <p:tnLst>
+      <p:par>
+        <p:cTn id="1" dur="indefinite" restart="never" nodeType="tmRoot"/>
+      </p:par>
+    </p:tnLst>
+  </p:timing>
+</p:sld>
+</file>
+
+<file path=ppt/slides/slide8.xml><?xml version="1.0" encoding="utf-8"?>
+<p:sld xmlns:a="http://schemas.openxmlformats.org/drawingml/2006/main" xmlns:r="http://schemas.openxmlformats.org/officeDocument/2006/relationships" xmlns:p="http://schemas.openxmlformats.org/presentationml/2006/main">
+  <p:cSld>
+    <p:spTree>
+      <p:nvGrpSpPr>
+        <p:cNvPr id="1" name=""/>
+        <p:cNvGrpSpPr/>
+        <p:nvPr/>
+      </p:nvGrpSpPr>
+      <p:grpSpPr>
+        <a:xfrm>
+          <a:off x="0" y="0"/>
+          <a:ext cx="0" cy="0"/>
+          <a:chOff x="0" y="0"/>
+          <a:chExt cx="0" cy="0"/>
+        </a:xfrm>
+      </p:grpSpPr>
+      <p:sp>
+        <p:nvSpPr>
+          <p:cNvPr id="2" name="Title 1"/>
+          <p:cNvSpPr>
+            <a:spLocks noGrp="1"/>
+          </p:cNvSpPr>
+          <p:nvPr>
+            <p:ph type="title"/>
+          </p:nvPr>
+        </p:nvSpPr>
+        <p:spPr/>
+        <p:txBody>
+          <a:bodyPr/>
+          <a:lstStyle/>
+          <a:p>
+            <a:r>
+              <a:rPr lang="en-GB" dirty="0" smtClean="0"/>
+              <a:t>Main Page</a:t>
+            </a:r>
+            <a:endParaRPr lang="en-GB" dirty="0"/>
+          </a:p>
+        </p:txBody>
+      </p:sp>
+      <p:pic>
+        <p:nvPicPr>
+          <p:cNvPr id="4" name="Content Placeholder 3" descr="wireframe.png"/>
+          <p:cNvPicPr>
+            <a:picLocks noGrp="1" noChangeAspect="1"/>
+          </p:cNvPicPr>
+          <p:nvPr>
+            <p:ph idx="1"/>
+          </p:nvPr>
+        </p:nvPicPr>
+        <p:blipFill>
+          <a:blip r:embed="rId2" cstate="print"/>
+          <a:stretch>
+            <a:fillRect/>
+          </a:stretch>
+        </p:blipFill>
+        <p:spPr>
+          <a:xfrm>
+            <a:off x="0" y="0"/>
+            <a:ext cx="9144000" cy="6858000"/>
+          </a:xfrm>
+        </p:spPr>
+      </p:pic>
+    </p:spTree>
+  </p:cSld>
+  <p:clrMapOvr>
+    <a:masterClrMapping/>
+  </p:clrMapOvr>
+  <p:timing>
+    <p:tnLst>
+      <p:par>
+        <p:cTn id="1" dur="indefinite" restart="never" nodeType="tmRoot"/>
+      </p:par>
+    </p:tnLst>
+  </p:timing>
+</p:sld>
+</file>
+
+<file path=ppt/slides/slide9.xml><?xml version="1.0" encoding="utf-8"?>
+<p:sld xmlns:a="http://schemas.openxmlformats.org/drawingml/2006/main" xmlns:r="http://schemas.openxmlformats.org/officeDocument/2006/relationships" xmlns:p="http://schemas.openxmlformats.org/presentationml/2006/main">
+  <p:cSld>
+    <p:spTree>
+      <p:nvGrpSpPr>
+        <p:cNvPr id="1" name=""/>
+        <p:cNvGrpSpPr/>
+        <p:nvPr/>
+      </p:nvGrpSpPr>
+      <p:grpSpPr>
+        <a:xfrm>
+          <a:off x="0" y="0"/>
+          <a:ext cx="0" cy="0"/>
+          <a:chOff x="0" y="0"/>
+          <a:chExt cx="0" cy="0"/>
+        </a:xfrm>
+      </p:grpSpPr>
+      <p:pic>
+        <p:nvPicPr>
+          <p:cNvPr id="2" name="Picture 1" descr="wireframe1 annotated.png"/>
+          <p:cNvPicPr>
+            <a:picLocks noChangeAspect="1"/>
+          </p:cNvPicPr>
+          <p:nvPr/>
+        </p:nvPicPr>
+        <p:blipFill>
+          <a:blip r:embed="rId2" cstate="print"/>
+          <a:stretch>
+            <a:fillRect/>
+          </a:stretch>
+        </p:blipFill>
+        <p:spPr>
+          <a:xfrm>
+            <a:off x="0" y="0"/>
+            <a:ext cx="9144000" cy="6858000"/>
+          </a:xfrm>
+          <a:prstGeom prst="rect">
+            <a:avLst/>
+          </a:prstGeom>
+        </p:spPr>
+      </p:pic>
+    </p:spTree>
+  </p:cSld>
+  <p:clrMapOvr>
+    <a:masterClrMapping/>
+  </p:clrMapOvr>
+  <p:timing>
+    <p:tnLst>
+      <p:par>
+        <p:cTn id="1" dur="indefinite" restart="never" nodeType="tmRoot"/>
+      </p:par>
+    </p:tnLst>
+  </p:timing>
 </p:sld>
 </file>
 

</xml_diff>

<commit_message>
Added system diagram and profile wireframe
</commit_message>
<xml_diff>
--- a/JokeRater.pptx
+++ b/JokeRater.pptx
@@ -12,12 +12,12 @@
     <p:sldId id="259" r:id="rId6"/>
     <p:sldId id="260" r:id="rId7"/>
     <p:sldId id="261" r:id="rId8"/>
-    <p:sldId id="262" r:id="rId9"/>
-    <p:sldId id="263" r:id="rId10"/>
-    <p:sldId id="264" r:id="rId11"/>
-    <p:sldId id="268" r:id="rId12"/>
-    <p:sldId id="265" r:id="rId13"/>
-    <p:sldId id="266" r:id="rId14"/>
+    <p:sldId id="263" r:id="rId9"/>
+    <p:sldId id="264" r:id="rId10"/>
+    <p:sldId id="268" r:id="rId11"/>
+    <p:sldId id="265" r:id="rId12"/>
+    <p:sldId id="266" r:id="rId13"/>
+    <p:sldId id="269" r:id="rId14"/>
   </p:sldIdLst>
   <p:sldSz cx="9144000" cy="6858000" type="screen4x3"/>
   <p:notesSz cx="6858000" cy="9144000"/>
@@ -301,7 +301,7 @@
             <a:fld id="{BFB62D08-2B6D-4BE7-BD75-624CBE385CC2}" type="datetimeFigureOut">
               <a:rPr lang="en-GB" smtClean="0"/>
               <a:pPr/>
-              <a:t>21/02/2015</a:t>
+              <a:t>23/02/2015</a:t>
             </a:fld>
             <a:endParaRPr lang="en-GB"/>
           </a:p>
@@ -468,7 +468,7 @@
             <a:fld id="{BFB62D08-2B6D-4BE7-BD75-624CBE385CC2}" type="datetimeFigureOut">
               <a:rPr lang="en-GB" smtClean="0"/>
               <a:pPr/>
-              <a:t>21/02/2015</a:t>
+              <a:t>23/02/2015</a:t>
             </a:fld>
             <a:endParaRPr lang="en-GB"/>
           </a:p>
@@ -645,7 +645,7 @@
             <a:fld id="{BFB62D08-2B6D-4BE7-BD75-624CBE385CC2}" type="datetimeFigureOut">
               <a:rPr lang="en-GB" smtClean="0"/>
               <a:pPr/>
-              <a:t>21/02/2015</a:t>
+              <a:t>23/02/2015</a:t>
             </a:fld>
             <a:endParaRPr lang="en-GB"/>
           </a:p>
@@ -812,7 +812,7 @@
             <a:fld id="{BFB62D08-2B6D-4BE7-BD75-624CBE385CC2}" type="datetimeFigureOut">
               <a:rPr lang="en-GB" smtClean="0"/>
               <a:pPr/>
-              <a:t>21/02/2015</a:t>
+              <a:t>23/02/2015</a:t>
             </a:fld>
             <a:endParaRPr lang="en-GB"/>
           </a:p>
@@ -1055,7 +1055,7 @@
             <a:fld id="{BFB62D08-2B6D-4BE7-BD75-624CBE385CC2}" type="datetimeFigureOut">
               <a:rPr lang="en-GB" smtClean="0"/>
               <a:pPr/>
-              <a:t>21/02/2015</a:t>
+              <a:t>23/02/2015</a:t>
             </a:fld>
             <a:endParaRPr lang="en-GB"/>
           </a:p>
@@ -1340,7 +1340,7 @@
             <a:fld id="{BFB62D08-2B6D-4BE7-BD75-624CBE385CC2}" type="datetimeFigureOut">
               <a:rPr lang="en-GB" smtClean="0"/>
               <a:pPr/>
-              <a:t>21/02/2015</a:t>
+              <a:t>23/02/2015</a:t>
             </a:fld>
             <a:endParaRPr lang="en-GB"/>
           </a:p>
@@ -1759,7 +1759,7 @@
             <a:fld id="{BFB62D08-2B6D-4BE7-BD75-624CBE385CC2}" type="datetimeFigureOut">
               <a:rPr lang="en-GB" smtClean="0"/>
               <a:pPr/>
-              <a:t>21/02/2015</a:t>
+              <a:t>23/02/2015</a:t>
             </a:fld>
             <a:endParaRPr lang="en-GB"/>
           </a:p>
@@ -1874,7 +1874,7 @@
             <a:fld id="{BFB62D08-2B6D-4BE7-BD75-624CBE385CC2}" type="datetimeFigureOut">
               <a:rPr lang="en-GB" smtClean="0"/>
               <a:pPr/>
-              <a:t>21/02/2015</a:t>
+              <a:t>23/02/2015</a:t>
             </a:fld>
             <a:endParaRPr lang="en-GB"/>
           </a:p>
@@ -1966,7 +1966,7 @@
             <a:fld id="{BFB62D08-2B6D-4BE7-BD75-624CBE385CC2}" type="datetimeFigureOut">
               <a:rPr lang="en-GB" smtClean="0"/>
               <a:pPr/>
-              <a:t>21/02/2015</a:t>
+              <a:t>23/02/2015</a:t>
             </a:fld>
             <a:endParaRPr lang="en-GB"/>
           </a:p>
@@ -2240,7 +2240,7 @@
             <a:fld id="{BFB62D08-2B6D-4BE7-BD75-624CBE385CC2}" type="datetimeFigureOut">
               <a:rPr lang="en-GB" smtClean="0"/>
               <a:pPr/>
-              <a:t>21/02/2015</a:t>
+              <a:t>23/02/2015</a:t>
             </a:fld>
             <a:endParaRPr lang="en-GB"/>
           </a:p>
@@ -2490,7 +2490,7 @@
             <a:fld id="{BFB62D08-2B6D-4BE7-BD75-624CBE385CC2}" type="datetimeFigureOut">
               <a:rPr lang="en-GB" smtClean="0"/>
               <a:pPr/>
-              <a:t>21/02/2015</a:t>
+              <a:t>23/02/2015</a:t>
             </a:fld>
             <a:endParaRPr lang="en-GB"/>
           </a:p>
@@ -2709,7 +2709,7 @@
             <a:fld id="{BFB62D08-2B6D-4BE7-BD75-624CBE385CC2}" type="datetimeFigureOut">
               <a:rPr lang="en-GB" smtClean="0"/>
               <a:pPr/>
-              <a:t>21/02/2015</a:t>
+              <a:t>23/02/2015</a:t>
             </a:fld>
             <a:endParaRPr lang="en-GB"/>
           </a:p>
@@ -3090,9 +3090,16 @@
             <p:ph type="subTitle" idx="1"/>
           </p:nvPr>
         </p:nvSpPr>
-        <p:spPr/>
-        <p:txBody>
-          <a:bodyPr/>
+        <p:spPr>
+          <a:xfrm>
+            <a:off x="1259632" y="3140968"/>
+            <a:ext cx="6624736" cy="2232248"/>
+          </a:xfrm>
+        </p:spPr>
+        <p:txBody>
+          <a:bodyPr>
+            <a:normAutofit lnSpcReduction="10000"/>
+          </a:bodyPr>
           <a:lstStyle/>
           <a:p>
             <a:r>
@@ -3101,32 +3108,73 @@
                   <a:schemeClr val="tx1"/>
                 </a:solidFill>
               </a:rPr>
-              <a:t>Team JR</a:t>
-            </a:r>
-            <a:endParaRPr lang="en-GB" dirty="0">
+              <a:t>Team </a:t>
+            </a:r>
+            <a:r>
+              <a:rPr lang="en-GB" dirty="0" smtClean="0">
+                <a:solidFill>
+                  <a:schemeClr val="tx1"/>
+                </a:solidFill>
+              </a:rPr>
+              <a:t>JR</a:t>
+            </a:r>
+          </a:p>
+          <a:p>
+            <a:endParaRPr lang="en-GB" dirty="0" smtClean="0">
               <a:solidFill>
                 <a:schemeClr val="tx1"/>
               </a:solidFill>
             </a:endParaRPr>
           </a:p>
-        </p:txBody>
-      </p:sp>
-      <p:sp>
-        <p:nvSpPr>
-          <p:cNvPr id="4" name="Title 3"/>
-          <p:cNvSpPr>
-            <a:spLocks noGrp="1"/>
-          </p:cNvSpPr>
-          <p:nvPr>
-            <p:ph type="ctrTitle"/>
-          </p:nvPr>
-        </p:nvSpPr>
-        <p:spPr/>
-        <p:txBody>
-          <a:bodyPr/>
-          <a:lstStyle/>
-          <a:p>
-            <a:endParaRPr lang="en-GB"/>
+          <a:p>
+            <a:r>
+              <a:rPr lang="en-GB" sz="1600" dirty="0" smtClean="0">
+                <a:solidFill>
+                  <a:schemeClr val="tx1"/>
+                </a:solidFill>
+              </a:rPr>
+              <a:t>Chris Brown – 2077762b</a:t>
+            </a:r>
+          </a:p>
+          <a:p>
+            <a:r>
+              <a:rPr lang="en-GB" sz="1600" dirty="0" smtClean="0">
+                <a:solidFill>
+                  <a:schemeClr val="tx1"/>
+                </a:solidFill>
+              </a:rPr>
+              <a:t>Gary Curran – 2090566c </a:t>
+            </a:r>
+          </a:p>
+          <a:p>
+            <a:r>
+              <a:rPr lang="en-GB" sz="1600" dirty="0" smtClean="0">
+                <a:solidFill>
+                  <a:schemeClr val="tx1"/>
+                </a:solidFill>
+              </a:rPr>
+              <a:t>Robert Allison – 1102085a</a:t>
+            </a:r>
+          </a:p>
+          <a:p>
+            <a:r>
+              <a:rPr lang="en-GB" sz="1600" dirty="0" smtClean="0">
+                <a:solidFill>
+                  <a:schemeClr val="tx1"/>
+                </a:solidFill>
+              </a:rPr>
+              <a:t>Ben Procter – 2078440p</a:t>
+            </a:r>
+            <a:endParaRPr lang="en-GB" sz="1600" dirty="0" smtClean="0">
+              <a:hlinkClick r:id="rId2"/>
+            </a:endParaRPr>
+          </a:p>
+          <a:p>
+            <a:endParaRPr lang="en-GB" sz="1600" dirty="0">
+              <a:solidFill>
+                <a:schemeClr val="tx1"/>
+              </a:solidFill>
+            </a:endParaRPr>
           </a:p>
         </p:txBody>
       </p:sp>
@@ -3139,15 +3187,15 @@
           <p:nvPr/>
         </p:nvPicPr>
         <p:blipFill>
-          <a:blip r:embed="rId2" cstate="print"/>
+          <a:blip r:embed="rId3" cstate="print"/>
           <a:stretch>
             <a:fillRect/>
           </a:stretch>
         </p:blipFill>
         <p:spPr>
           <a:xfrm>
-            <a:off x="251520" y="1124744"/>
-            <a:ext cx="8676456" cy="2512328"/>
+            <a:off x="-1" y="0"/>
+            <a:ext cx="9106713" cy="2636912"/>
           </a:xfrm>
           <a:prstGeom prst="rect">
             <a:avLst/>
@@ -3186,62 +3234,6 @@
           <a:chExt cx="0" cy="0"/>
         </a:xfrm>
       </p:grpSpPr>
-      <p:pic>
-        <p:nvPicPr>
-          <p:cNvPr id="2" name="Picture 1" descr="wireframe profile.png"/>
-          <p:cNvPicPr>
-            <a:picLocks noChangeAspect="1"/>
-          </p:cNvPicPr>
-          <p:nvPr/>
-        </p:nvPicPr>
-        <p:blipFill>
-          <a:blip r:embed="rId2" cstate="print"/>
-          <a:stretch>
-            <a:fillRect/>
-          </a:stretch>
-        </p:blipFill>
-        <p:spPr>
-          <a:xfrm>
-            <a:off x="0" y="0"/>
-            <a:ext cx="9144000" cy="6858000"/>
-          </a:xfrm>
-          <a:prstGeom prst="rect">
-            <a:avLst/>
-          </a:prstGeom>
-        </p:spPr>
-      </p:pic>
-    </p:spTree>
-  </p:cSld>
-  <p:clrMapOvr>
-    <a:masterClrMapping/>
-  </p:clrMapOvr>
-  <p:timing>
-    <p:tnLst>
-      <p:par>
-        <p:cTn id="1" dur="indefinite" restart="never" nodeType="tmRoot"/>
-      </p:par>
-    </p:tnLst>
-  </p:timing>
-</p:sld>
-</file>
-
-<file path=ppt/slides/slide11.xml><?xml version="1.0" encoding="utf-8"?>
-<p:sld xmlns:a="http://schemas.openxmlformats.org/drawingml/2006/main" xmlns:r="http://schemas.openxmlformats.org/officeDocument/2006/relationships" xmlns:p="http://schemas.openxmlformats.org/presentationml/2006/main">
-  <p:cSld>
-    <p:spTree>
-      <p:nvGrpSpPr>
-        <p:cNvPr id="1" name=""/>
-        <p:cNvGrpSpPr/>
-        <p:nvPr/>
-      </p:nvGrpSpPr>
-      <p:grpSpPr>
-        <a:xfrm>
-          <a:off x="0" y="0"/>
-          <a:ext cx="0" cy="0"/>
-          <a:chOff x="0" y="0"/>
-          <a:chExt cx="0" cy="0"/>
-        </a:xfrm>
-      </p:grpSpPr>
       <p:sp>
         <p:nvSpPr>
           <p:cNvPr id="2" name="Title 1"/>
@@ -3297,6 +3289,220 @@
 </p:sld>
 </file>
 
+<file path=ppt/slides/slide11.xml><?xml version="1.0" encoding="utf-8"?>
+<p:sld xmlns:a="http://schemas.openxmlformats.org/drawingml/2006/main" xmlns:r="http://schemas.openxmlformats.org/officeDocument/2006/relationships" xmlns:p="http://schemas.openxmlformats.org/presentationml/2006/main">
+  <p:cSld>
+    <p:spTree>
+      <p:nvGrpSpPr>
+        <p:cNvPr id="1" name=""/>
+        <p:cNvGrpSpPr/>
+        <p:nvPr/>
+      </p:nvGrpSpPr>
+      <p:grpSpPr>
+        <a:xfrm>
+          <a:off x="0" y="0"/>
+          <a:ext cx="0" cy="0"/>
+          <a:chOff x="0" y="0"/>
+          <a:chExt cx="0" cy="0"/>
+        </a:xfrm>
+      </p:grpSpPr>
+      <p:sp>
+        <p:nvSpPr>
+          <p:cNvPr id="2" name="Title 1"/>
+          <p:cNvSpPr>
+            <a:spLocks noGrp="1"/>
+          </p:cNvSpPr>
+          <p:nvPr>
+            <p:ph type="title"/>
+          </p:nvPr>
+        </p:nvSpPr>
+        <p:spPr/>
+        <p:txBody>
+          <a:bodyPr/>
+          <a:lstStyle/>
+          <a:p>
+            <a:r>
+              <a:rPr lang="en-GB" dirty="0" smtClean="0"/>
+              <a:t>URL Mapping (1)</a:t>
+            </a:r>
+            <a:endParaRPr lang="en-GB" dirty="0"/>
+          </a:p>
+        </p:txBody>
+      </p:sp>
+      <p:sp>
+        <p:nvSpPr>
+          <p:cNvPr id="3" name="Content Placeholder 2"/>
+          <p:cNvSpPr>
+            <a:spLocks noGrp="1"/>
+          </p:cNvSpPr>
+          <p:nvPr>
+            <p:ph idx="1"/>
+          </p:nvPr>
+        </p:nvSpPr>
+        <p:spPr/>
+        <p:txBody>
+          <a:bodyPr>
+            <a:normAutofit/>
+          </a:bodyPr>
+          <a:lstStyle/>
+          <a:p>
+            <a:pPr>
+              <a:buNone/>
+            </a:pPr>
+            <a:r>
+              <a:rPr lang="en-GB" sz="2400" dirty="0" smtClean="0"/>
+              <a:t>/</a:t>
+            </a:r>
+            <a:r>
+              <a:rPr lang="en-GB" sz="2400" dirty="0" err="1" smtClean="0"/>
+              <a:t>JokeRater</a:t>
+            </a:r>
+            <a:r>
+              <a:rPr lang="en-GB" sz="2400" dirty="0" smtClean="0"/>
+              <a:t>/index</a:t>
+            </a:r>
+          </a:p>
+          <a:p>
+            <a:pPr>
+              <a:buNone/>
+            </a:pPr>
+            <a:r>
+              <a:rPr lang="en-GB" sz="1600" dirty="0" smtClean="0"/>
+              <a:t>The first page the user sees showing two jokes from a random category to be compared together</a:t>
+            </a:r>
+          </a:p>
+          <a:p>
+            <a:pPr>
+              <a:buNone/>
+            </a:pPr>
+            <a:endParaRPr lang="en-GB" sz="1600" dirty="0" smtClean="0"/>
+          </a:p>
+          <a:p>
+            <a:pPr>
+              <a:buNone/>
+            </a:pPr>
+            <a:r>
+              <a:rPr lang="en-GB" sz="2400" dirty="0" smtClean="0"/>
+              <a:t>/</a:t>
+            </a:r>
+            <a:r>
+              <a:rPr lang="en-GB" sz="2400" dirty="0" err="1" smtClean="0"/>
+              <a:t>JokeRater</a:t>
+            </a:r>
+            <a:r>
+              <a:rPr lang="en-GB" sz="2400" dirty="0" smtClean="0"/>
+              <a:t>/joke</a:t>
+            </a:r>
+          </a:p>
+          <a:p>
+            <a:pPr>
+              <a:buNone/>
+            </a:pPr>
+            <a:r>
+              <a:rPr lang="en-GB" sz="1600" dirty="0" smtClean="0"/>
+              <a:t>Accessed when viewing a joke directly or have selected random joke</a:t>
+            </a:r>
+          </a:p>
+          <a:p>
+            <a:pPr>
+              <a:buNone/>
+            </a:pPr>
+            <a:endParaRPr lang="en-GB" sz="1600" dirty="0" smtClean="0"/>
+          </a:p>
+          <a:p>
+            <a:pPr>
+              <a:buNone/>
+            </a:pPr>
+            <a:r>
+              <a:rPr lang="en-GB" sz="2400" dirty="0" smtClean="0"/>
+              <a:t>/</a:t>
+            </a:r>
+            <a:r>
+              <a:rPr lang="en-GB" sz="2400" dirty="0" err="1" smtClean="0"/>
+              <a:t>JokeRater</a:t>
+            </a:r>
+            <a:r>
+              <a:rPr lang="en-GB" sz="2400" dirty="0" smtClean="0"/>
+              <a:t>/category/&lt;</a:t>
+            </a:r>
+            <a:r>
+              <a:rPr lang="en-GB" sz="2400" dirty="0" err="1" smtClean="0"/>
+              <a:t>category_name_slug</a:t>
+            </a:r>
+            <a:r>
+              <a:rPr lang="en-GB" sz="2400" dirty="0" smtClean="0"/>
+              <a:t>&gt;</a:t>
+            </a:r>
+          </a:p>
+          <a:p>
+            <a:pPr>
+              <a:buNone/>
+            </a:pPr>
+            <a:r>
+              <a:rPr lang="en-GB" sz="1600" dirty="0" smtClean="0"/>
+              <a:t>Similar to the main page but guarantees the jokes will be from a given category  </a:t>
+            </a:r>
+          </a:p>
+          <a:p>
+            <a:pPr>
+              <a:buNone/>
+            </a:pPr>
+            <a:endParaRPr lang="en-GB" sz="1600" dirty="0" smtClean="0"/>
+          </a:p>
+          <a:p>
+            <a:pPr>
+              <a:buNone/>
+            </a:pPr>
+            <a:r>
+              <a:rPr lang="en-GB" sz="2400" dirty="0" smtClean="0"/>
+              <a:t>/</a:t>
+            </a:r>
+            <a:r>
+              <a:rPr lang="en-GB" sz="2400" dirty="0" err="1" smtClean="0"/>
+              <a:t>JokeRater</a:t>
+            </a:r>
+            <a:r>
+              <a:rPr lang="en-GB" sz="2400" dirty="0" smtClean="0"/>
+              <a:t>/</a:t>
+            </a:r>
+            <a:r>
+              <a:rPr lang="en-GB" sz="2400" dirty="0" err="1" smtClean="0"/>
+              <a:t>topRated</a:t>
+            </a:r>
+            <a:endParaRPr lang="en-GB" sz="2400" dirty="0" smtClean="0"/>
+          </a:p>
+          <a:p>
+            <a:pPr>
+              <a:buNone/>
+            </a:pPr>
+            <a:r>
+              <a:rPr lang="en-GB" sz="1600" dirty="0" smtClean="0"/>
+              <a:t>Allows the user to view the top 20 jokes in a given category, for a given time period</a:t>
+            </a:r>
+          </a:p>
+          <a:p>
+            <a:pPr>
+              <a:buNone/>
+            </a:pPr>
+            <a:endParaRPr lang="en-GB" sz="2400" dirty="0" smtClean="0"/>
+          </a:p>
+        </p:txBody>
+      </p:sp>
+    </p:spTree>
+  </p:cSld>
+  <p:clrMapOvr>
+    <a:masterClrMapping/>
+  </p:clrMapOvr>
+  <p:timing>
+    <p:tnLst>
+      <p:par>
+        <p:cTn id="1" dur="indefinite" restart="never" nodeType="tmRoot"/>
+      </p:par>
+    </p:tnLst>
+  </p:timing>
+</p:sld>
+</file>
+
 <file path=ppt/slides/slide12.xml><?xml version="1.0" encoding="utf-8"?>
 <p:sld xmlns:a="http://schemas.openxmlformats.org/drawingml/2006/main" xmlns:r="http://schemas.openxmlformats.org/officeDocument/2006/relationships" xmlns:p="http://schemas.openxmlformats.org/presentationml/2006/main">
   <p:cSld>
@@ -3331,11 +3537,7 @@
           <a:p>
             <a:r>
               <a:rPr lang="en-GB" dirty="0" smtClean="0"/>
-              <a:t>URL Mapping (1</a:t>
-            </a:r>
-            <a:r>
-              <a:rPr lang="en-GB" dirty="0" smtClean="0"/>
-              <a:t>)</a:t>
+              <a:t>URL Mapping (2)</a:t>
             </a:r>
             <a:endParaRPr lang="en-GB" dirty="0"/>
           </a:p>
@@ -3353,9 +3555,7 @@
         </p:nvSpPr>
         <p:spPr/>
         <p:txBody>
-          <a:bodyPr>
-            <a:normAutofit/>
-          </a:bodyPr>
+          <a:bodyPr/>
           <a:lstStyle/>
           <a:p>
             <a:pPr>
@@ -3371,7 +3571,7 @@
             </a:r>
             <a:r>
               <a:rPr lang="en-GB" sz="2400" dirty="0" smtClean="0"/>
-              <a:t>/main</a:t>
+              <a:t>/login</a:t>
             </a:r>
           </a:p>
           <a:p>
@@ -3380,7 +3580,7 @@
             </a:pPr>
             <a:r>
               <a:rPr lang="en-GB" sz="1600" dirty="0" smtClean="0"/>
-              <a:t>The first page the user sees showing two jokes from a random category to be compared together</a:t>
+              <a:t>Login page</a:t>
             </a:r>
           </a:p>
           <a:p>
@@ -3403,7 +3603,7 @@
             </a:r>
             <a:r>
               <a:rPr lang="en-GB" sz="2400" dirty="0" smtClean="0"/>
-              <a:t>/joke</a:t>
+              <a:t>/register</a:t>
             </a:r>
           </a:p>
           <a:p>
@@ -3412,14 +3612,14 @@
             </a:pPr>
             <a:r>
               <a:rPr lang="en-GB" sz="1600" dirty="0" smtClean="0"/>
-              <a:t>Accessed when viewing a joke directly or have selected random joke</a:t>
+              <a:t>Allows first time users to register with the site such that they are able to upload jokes</a:t>
             </a:r>
           </a:p>
           <a:p>
             <a:pPr>
               <a:buNone/>
             </a:pPr>
-            <a:endParaRPr lang="en-GB" sz="1600" dirty="0" smtClean="0"/>
+            <a:endParaRPr lang="en-GB" sz="2400" dirty="0" smtClean="0"/>
           </a:p>
           <a:p>
             <a:pPr>
@@ -3435,8 +3635,13 @@
             </a:r>
             <a:r>
               <a:rPr lang="en-GB" sz="2400" dirty="0" smtClean="0"/>
-              <a:t>/category/...........</a:t>
-            </a:r>
+              <a:t>/</a:t>
+            </a:r>
+            <a:r>
+              <a:rPr lang="en-GB" sz="2400" dirty="0" err="1" smtClean="0"/>
+              <a:t>myProfile</a:t>
+            </a:r>
+            <a:endParaRPr lang="en-GB" sz="2400" dirty="0" smtClean="0"/>
           </a:p>
           <a:p>
             <a:pPr>
@@ -3444,51 +3649,11 @@
             </a:pPr>
             <a:r>
               <a:rPr lang="en-GB" sz="1600" dirty="0" smtClean="0"/>
-              <a:t>Similar to the main page but guarantees the jokes will be from a given category  </a:t>
-            </a:r>
-          </a:p>
-          <a:p>
-            <a:pPr>
-              <a:buNone/>
-            </a:pPr>
-            <a:endParaRPr lang="en-GB" sz="1600" dirty="0" smtClean="0"/>
-          </a:p>
-          <a:p>
-            <a:pPr>
-              <a:buNone/>
-            </a:pPr>
-            <a:r>
-              <a:rPr lang="en-GB" sz="2400" dirty="0" smtClean="0"/>
-              <a:t>/</a:t>
-            </a:r>
-            <a:r>
-              <a:rPr lang="en-GB" sz="2400" dirty="0" err="1" smtClean="0"/>
-              <a:t>JokeRater</a:t>
-            </a:r>
-            <a:r>
-              <a:rPr lang="en-GB" sz="2400" dirty="0" smtClean="0"/>
-              <a:t>/</a:t>
-            </a:r>
-            <a:r>
-              <a:rPr lang="en-GB" sz="2400" dirty="0" err="1" smtClean="0"/>
-              <a:t>topRated</a:t>
-            </a:r>
-            <a:endParaRPr lang="en-GB" sz="2400" dirty="0" smtClean="0"/>
-          </a:p>
-          <a:p>
-            <a:pPr>
-              <a:buNone/>
-            </a:pPr>
-            <a:r>
-              <a:rPr lang="en-GB" sz="1600" dirty="0" smtClean="0"/>
-              <a:t>Allows the user to view the top 20 jokes in a given category, for a given time period</a:t>
-            </a:r>
-          </a:p>
-          <a:p>
-            <a:pPr>
-              <a:buNone/>
-            </a:pPr>
-            <a:endParaRPr lang="en-GB" sz="2400" dirty="0" smtClean="0"/>
+              <a:t>Users can upload jokes as well as viewing the statistics of the jokes they have previously uploaded</a:t>
+            </a:r>
+          </a:p>
+          <a:p>
+            <a:endParaRPr lang="en-GB" dirty="0"/>
           </a:p>
         </p:txBody>
       </p:sp>
@@ -3524,9 +3689,33 @@
           <a:chExt cx="0" cy="0"/>
         </a:xfrm>
       </p:grpSpPr>
-      <p:sp>
-        <p:nvSpPr>
-          <p:cNvPr id="2" name="Title 1"/>
+      <p:pic>
+        <p:nvPicPr>
+          <p:cNvPr id="2" name="Picture 1" descr="N-tier-done.jpg"/>
+          <p:cNvPicPr>
+            <a:picLocks noChangeAspect="1"/>
+          </p:cNvPicPr>
+          <p:nvPr/>
+        </p:nvPicPr>
+        <p:blipFill>
+          <a:blip r:embed="rId2" cstate="print"/>
+          <a:stretch>
+            <a:fillRect/>
+          </a:stretch>
+        </p:blipFill>
+        <p:spPr>
+          <a:xfrm>
+            <a:off x="0" y="1637172"/>
+            <a:ext cx="9144000" cy="3952068"/>
+          </a:xfrm>
+          <a:prstGeom prst="rect">
+            <a:avLst/>
+          </a:prstGeom>
+        </p:spPr>
+      </p:pic>
+      <p:sp>
+        <p:nvSpPr>
+          <p:cNvPr id="3" name="Title 2"/>
           <p:cNvSpPr>
             <a:spLocks noGrp="1"/>
           </p:cNvSpPr>
@@ -3541,126 +3730,8 @@
           <a:p>
             <a:r>
               <a:rPr lang="en-GB" dirty="0" smtClean="0"/>
-              <a:t>URL Mapping (2</a:t>
-            </a:r>
-            <a:r>
-              <a:rPr lang="en-GB" dirty="0" smtClean="0"/>
-              <a:t>)</a:t>
-            </a:r>
-            <a:endParaRPr lang="en-GB" dirty="0"/>
-          </a:p>
-        </p:txBody>
-      </p:sp>
-      <p:sp>
-        <p:nvSpPr>
-          <p:cNvPr id="3" name="Content Placeholder 2"/>
-          <p:cNvSpPr>
-            <a:spLocks noGrp="1"/>
-          </p:cNvSpPr>
-          <p:nvPr>
-            <p:ph idx="1"/>
-          </p:nvPr>
-        </p:nvSpPr>
-        <p:spPr/>
-        <p:txBody>
-          <a:bodyPr/>
-          <a:lstStyle/>
-          <a:p>
-            <a:pPr>
-              <a:buNone/>
-            </a:pPr>
-            <a:r>
-              <a:rPr lang="en-GB" sz="2400" dirty="0" smtClean="0"/>
-              <a:t>/</a:t>
-            </a:r>
-            <a:r>
-              <a:rPr lang="en-GB" sz="2400" dirty="0" err="1" smtClean="0"/>
-              <a:t>JokeRater</a:t>
-            </a:r>
-            <a:r>
-              <a:rPr lang="en-GB" sz="2400" dirty="0" smtClean="0"/>
-              <a:t>/login</a:t>
-            </a:r>
-          </a:p>
-          <a:p>
-            <a:pPr>
-              <a:buNone/>
-            </a:pPr>
-            <a:r>
-              <a:rPr lang="en-GB" sz="1600" dirty="0" smtClean="0"/>
-              <a:t>Login page</a:t>
-            </a:r>
-          </a:p>
-          <a:p>
-            <a:pPr>
-              <a:buNone/>
-            </a:pPr>
-            <a:endParaRPr lang="en-GB" sz="1600" dirty="0" smtClean="0"/>
-          </a:p>
-          <a:p>
-            <a:pPr>
-              <a:buNone/>
-            </a:pPr>
-            <a:r>
-              <a:rPr lang="en-GB" sz="2400" dirty="0" smtClean="0"/>
-              <a:t>/</a:t>
-            </a:r>
-            <a:r>
-              <a:rPr lang="en-GB" sz="2400" dirty="0" err="1" smtClean="0"/>
-              <a:t>JokeRater</a:t>
-            </a:r>
-            <a:r>
-              <a:rPr lang="en-GB" sz="2400" dirty="0" smtClean="0"/>
-              <a:t>/register</a:t>
-            </a:r>
-          </a:p>
-          <a:p>
-            <a:pPr>
-              <a:buNone/>
-            </a:pPr>
-            <a:r>
-              <a:rPr lang="en-GB" sz="1600" dirty="0" smtClean="0"/>
-              <a:t>Allows first time users to register with the site such that they are able to upload jokes</a:t>
-            </a:r>
-          </a:p>
-          <a:p>
-            <a:pPr>
-              <a:buNone/>
-            </a:pPr>
-            <a:endParaRPr lang="en-GB" sz="2400" dirty="0" smtClean="0"/>
-          </a:p>
-          <a:p>
-            <a:pPr>
-              <a:buNone/>
-            </a:pPr>
-            <a:r>
-              <a:rPr lang="en-GB" sz="2400" dirty="0" smtClean="0"/>
-              <a:t>/</a:t>
-            </a:r>
-            <a:r>
-              <a:rPr lang="en-GB" sz="2400" dirty="0" err="1" smtClean="0"/>
-              <a:t>JokeRater</a:t>
-            </a:r>
-            <a:r>
-              <a:rPr lang="en-GB" sz="2400" dirty="0" smtClean="0"/>
-              <a:t>/</a:t>
-            </a:r>
-            <a:r>
-              <a:rPr lang="en-GB" sz="2400" dirty="0" err="1" smtClean="0"/>
-              <a:t>myProfile</a:t>
-            </a:r>
-            <a:endParaRPr lang="en-GB" sz="2400" dirty="0" smtClean="0"/>
-          </a:p>
-          <a:p>
-            <a:pPr>
-              <a:buNone/>
-            </a:pPr>
-            <a:r>
-              <a:rPr lang="en-GB" sz="1600" dirty="0" smtClean="0"/>
-              <a:t>Users can upload jokes as well as viewing the statistics of the jokes they have previously uploaded</a:t>
-            </a:r>
-          </a:p>
-          <a:p>
+              <a:t>System Architecture Diagram</a:t>
+            </a:r>
             <a:endParaRPr lang="en-GB" dirty="0"/>
           </a:p>
         </p:txBody>
@@ -3670,13 +3741,6 @@
   <p:clrMapOvr>
     <a:masterClrMapping/>
   </p:clrMapOvr>
-  <p:timing>
-    <p:tnLst>
-      <p:par>
-        <p:cTn id="1" dur="indefinite" restart="never" nodeType="tmRoot"/>
-      </p:par>
-    </p:tnLst>
-  </p:timing>
 </p:sld>
 </file>
 
@@ -5081,38 +5145,13 @@
           <a:chExt cx="0" cy="0"/>
         </a:xfrm>
       </p:grpSpPr>
-      <p:sp>
-        <p:nvSpPr>
-          <p:cNvPr id="2" name="Title 1"/>
-          <p:cNvSpPr>
-            <a:spLocks noGrp="1"/>
-          </p:cNvSpPr>
-          <p:nvPr>
-            <p:ph type="title"/>
-          </p:nvPr>
-        </p:nvSpPr>
-        <p:spPr/>
-        <p:txBody>
-          <a:bodyPr/>
-          <a:lstStyle/>
-          <a:p>
-            <a:r>
-              <a:rPr lang="en-GB" dirty="0" smtClean="0"/>
-              <a:t>Main Page</a:t>
-            </a:r>
-            <a:endParaRPr lang="en-GB" dirty="0"/>
-          </a:p>
-        </p:txBody>
-      </p:sp>
       <p:pic>
         <p:nvPicPr>
-          <p:cNvPr id="4" name="Content Placeholder 3" descr="wireframe.png"/>
+          <p:cNvPr id="2" name="Picture 1" descr="wireframe1 annotated.png"/>
           <p:cNvPicPr>
-            <a:picLocks noGrp="1" noChangeAspect="1"/>
+            <a:picLocks noChangeAspect="1"/>
           </p:cNvPicPr>
-          <p:nvPr>
-            <p:ph idx="1"/>
-          </p:nvPr>
+          <p:nvPr/>
         </p:nvPicPr>
         <p:blipFill>
           <a:blip r:embed="rId2" cstate="print"/>
@@ -5125,6 +5164,9 @@
             <a:off x="0" y="0"/>
             <a:ext cx="9144000" cy="6858000"/>
           </a:xfrm>
+          <a:prstGeom prst="rect">
+            <a:avLst/>
+          </a:prstGeom>
         </p:spPr>
       </p:pic>
     </p:spTree>
@@ -5161,7 +5203,7 @@
       </p:grpSpPr>
       <p:pic>
         <p:nvPicPr>
-          <p:cNvPr id="2" name="Picture 1" descr="wireframe1 annotated.png"/>
+          <p:cNvPr id="4" name="Picture 3" descr="wireframe profile.png"/>
           <p:cNvPicPr>
             <a:picLocks noChangeAspect="1"/>
           </p:cNvPicPr>
@@ -5175,8 +5217,8 @@
         </p:blipFill>
         <p:spPr>
           <a:xfrm>
-            <a:off x="0" y="0"/>
-            <a:ext cx="9144000" cy="6858000"/>
+            <a:off x="0" y="399361"/>
+            <a:ext cx="9144000" cy="6059277"/>
           </a:xfrm>
           <a:prstGeom prst="rect">
             <a:avLst/>

</xml_diff>